<commit_message>
change to PPT(include wireframe images), add flight-practise folder(Hooi's code) and add footer to wireframe images
</commit_message>
<xml_diff>
--- a/ACDH-FlightAppProject.pptx
+++ b/ACDH-FlightAppProject.pptx
@@ -587,7 +587,7 @@
           <a:p>
             <a:fld id="{EA0C0817-A112-4847-8014-A94B7D2A4EA3}" type="datetime1">
               <a:rPr lang="en-US" smtClean="0"/>
-              <a:t>4/11/2022</a:t>
+              <a:t>4/12/2022</a:t>
             </a:fld>
             <a:endParaRPr lang="en-US" dirty="0"/>
           </a:p>
@@ -789,7 +789,7 @@
           <a:p>
             <a:fld id="{7332B432-ACDA-4023-A761-2BAB76577B62}" type="datetime1">
               <a:rPr lang="en-US" smtClean="0"/>
-              <a:t>4/11/2022</a:t>
+              <a:t>4/12/2022</a:t>
             </a:fld>
             <a:endParaRPr lang="en-US" dirty="0"/>
           </a:p>
@@ -1388,7 +1388,7 @@
           <a:p>
             <a:fld id="{D9C646AA-F36E-4540-911D-FFFC0A0EF24A}" type="datetime1">
               <a:rPr lang="en-US" smtClean="0"/>
-              <a:t>4/11/2022</a:t>
+              <a:t>4/12/2022</a:t>
             </a:fld>
             <a:endParaRPr lang="en-US" dirty="0"/>
           </a:p>
@@ -1708,7 +1708,7 @@
           <a:p>
             <a:fld id="{69186D26-FA5F-4637-B602-B7C2DC34CFD4}" type="datetime1">
               <a:rPr lang="en-US" smtClean="0"/>
-              <a:t>4/11/2022</a:t>
+              <a:t>4/12/2022</a:t>
             </a:fld>
             <a:endParaRPr lang="en-US" dirty="0"/>
           </a:p>
@@ -2145,7 +2145,7 @@
           <a:p>
             <a:fld id="{8A7F15D8-96D1-4781-BC50-CA8A088B2FE4}" type="datetime1">
               <a:rPr lang="en-US" smtClean="0"/>
-              <a:t>4/11/2022</a:t>
+              <a:t>4/12/2022</a:t>
             </a:fld>
             <a:endParaRPr lang="en-US" dirty="0"/>
           </a:p>
@@ -2263,7 +2263,7 @@
           <a:p>
             <a:fld id="{F9A96C99-B8F8-4528-BD05-0E16E943DC09}" type="datetime1">
               <a:rPr lang="en-US" smtClean="0"/>
-              <a:t>4/11/2022</a:t>
+              <a:t>4/12/2022</a:t>
             </a:fld>
             <a:endParaRPr lang="en-US" dirty="0"/>
           </a:p>
@@ -2358,7 +2358,7 @@
           <a:p>
             <a:fld id="{03636942-C211-4B28-8DBD-C953E00AF71B}" type="datetime1">
               <a:rPr lang="en-US" smtClean="0"/>
-              <a:t>4/11/2022</a:t>
+              <a:t>4/12/2022</a:t>
             </a:fld>
             <a:endParaRPr lang="en-US" dirty="0"/>
           </a:p>
@@ -2775,7 +2775,7 @@
           <a:p>
             <a:fld id="{7E8D12A6-918A-48BD-8CB9-CA713993B0EA}" type="datetime1">
               <a:rPr lang="en-US" smtClean="0"/>
-              <a:t>4/11/2022</a:t>
+              <a:t>4/12/2022</a:t>
             </a:fld>
             <a:endParaRPr lang="en-US" dirty="0"/>
           </a:p>
@@ -3037,7 +3037,7 @@
             <a:fld id="{E778CE86-875F-4587-BCF6-FA054AFC0D53}" type="datetime1">
               <a:rPr lang="en-US" smtClean="0"/>
               <a:pPr/>
-              <a:t>4/11/2022</a:t>
+              <a:t>4/12/2022</a:t>
             </a:fld>
             <a:endParaRPr lang="en-US" dirty="0"/>
           </a:p>
@@ -3553,7 +3553,7 @@
           <a:p>
             <a:fld id="{F6FA2B21-3FCD-4721-B95C-427943F61125}" type="datetime1">
               <a:rPr lang="en-US" smtClean="0"/>
-              <a:t>4/11/2022</a:t>
+              <a:t>4/12/2022</a:t>
             </a:fld>
             <a:endParaRPr lang="en-US" dirty="0"/>
           </a:p>
@@ -4071,7 +4071,7 @@
                 <a16:creationId xmlns:a16="http://schemas.microsoft.com/office/drawing/2014/main" id="{2644B391-9BFE-445C-A9EC-F544BB85FBC7}"/>
               </a:ext>
               <a:ext uri="{C183D7F6-B498-43B3-948B-1728B52AA6E4}">
-                <adec:decorative xmlns:adec="http://schemas.microsoft.com/office/drawing/2017/decorative" val="1"/>
+                <adec:decorative xmlns:adec="http://schemas.microsoft.com/office/drawing/2017/decorative" xmlns="" val="1"/>
               </a:ext>
             </a:extLst>
           </p:cNvPr>
@@ -4116,7 +4116,7 @@
                 <a16:creationId xmlns:a16="http://schemas.microsoft.com/office/drawing/2014/main" id="{80F26E69-87D9-4655-AE7B-280A87AA3CAD}"/>
               </a:ext>
               <a:ext uri="{C183D7F6-B498-43B3-948B-1728B52AA6E4}">
-                <adec:decorative xmlns:adec="http://schemas.microsoft.com/office/drawing/2017/decorative" val="1"/>
+                <adec:decorative xmlns:adec="http://schemas.microsoft.com/office/drawing/2017/decorative" xmlns="" val="1"/>
               </a:ext>
             </a:extLst>
           </p:cNvPr>
@@ -4245,6 +4245,13 @@
   <p:clrMapOvr>
     <a:overrideClrMapping bg1="dk1" tx1="lt1" bg2="dk2" tx2="lt2" accent1="accent1" accent2="accent2" accent3="accent3" accent4="accent4" accent5="accent5" accent6="accent6" hlink="hlink" folHlink="folHlink"/>
   </p:clrMapOvr>
+  <p:timing>
+    <p:tnLst>
+      <p:par>
+        <p:cTn id="1" dur="indefinite" restart="never" nodeType="tmRoot"/>
+      </p:par>
+    </p:tnLst>
+  </p:timing>
 </p:sld>
 </file>
 
@@ -4575,7 +4582,7 @@
                   <a14:useLocalDpi xmlns:a14="http://schemas.microsoft.com/office/drawing/2010/main" val="0"/>
                 </a:ext>
                 <a:ext uri="{96DAC541-7B7A-43D3-8B79-37D633B846F1}">
-                  <asvg:svgBlip xmlns:asvg="http://schemas.microsoft.com/office/drawing/2016/SVG/main" r:embed="rId3"/>
+                  <asvg:svgBlip xmlns:asvg="http://schemas.microsoft.com/office/drawing/2016/SVG/main" xmlns="" r:embed="rId3"/>
                 </a:ext>
               </a:extLst>
             </a:blip>
@@ -4826,7 +4833,7 @@
                   <a14:useLocalDpi xmlns:a14="http://schemas.microsoft.com/office/drawing/2010/main" val="0"/>
                 </a:ext>
                 <a:ext uri="{96DAC541-7B7A-43D3-8B79-37D633B846F1}">
-                  <asvg:svgBlip xmlns:asvg="http://schemas.microsoft.com/office/drawing/2016/SVG/main" r:embed="rId5"/>
+                  <asvg:svgBlip xmlns:asvg="http://schemas.microsoft.com/office/drawing/2016/SVG/main" xmlns="" r:embed="rId5"/>
                 </a:ext>
               </a:extLst>
             </a:blip>
@@ -5040,6 +5047,13 @@
   <p:clrMapOvr>
     <a:masterClrMapping/>
   </p:clrMapOvr>
+  <p:timing>
+    <p:tnLst>
+      <p:par>
+        <p:cTn id="1" dur="indefinite" restart="never" nodeType="tmRoot"/>
+      </p:par>
+    </p:tnLst>
+  </p:timing>
 </p:sld>
 </file>
 
@@ -5201,7 +5215,7 @@
                     <a14:useLocalDpi xmlns:a14="http://schemas.microsoft.com/office/drawing/2010/main" val="0"/>
                   </a:ext>
                   <a:ext uri="{96DAC541-7B7A-43D3-8B79-37D633B846F1}">
-                    <asvg:svgBlip xmlns:asvg="http://schemas.microsoft.com/office/drawing/2016/SVG/main" r:embed="rId3"/>
+                    <asvg:svgBlip xmlns:asvg="http://schemas.microsoft.com/office/drawing/2016/SVG/main" xmlns="" r:embed="rId3"/>
                   </a:ext>
                 </a:extLst>
               </a:blip>
@@ -5240,6 +5254,94 @@
           </p:style>
         </p:sp>
       </p:grpSp>
+      <p:pic>
+        <p:nvPicPr>
+          <p:cNvPr id="6" name="Picture 5"/>
+          <p:cNvPicPr>
+            <a:picLocks noChangeAspect="1"/>
+          </p:cNvPicPr>
+          <p:nvPr/>
+        </p:nvPicPr>
+        <p:blipFill rotWithShape="1">
+          <a:blip r:embed="rId4">
+            <a:extLst>
+              <a:ext uri="{28A0092B-C50C-407E-A947-70E740481C1C}">
+                <a14:useLocalDpi xmlns:a14="http://schemas.microsoft.com/office/drawing/2010/main" val="0"/>
+              </a:ext>
+            </a:extLst>
+          </a:blip>
+          <a:srcRect b="23704"/>
+          <a:stretch/>
+        </p:blipFill>
+        <p:spPr>
+          <a:xfrm>
+            <a:off x="353728" y="2461156"/>
+            <a:ext cx="6777492" cy="4021066"/>
+          </a:xfrm>
+          <a:prstGeom prst="rect">
+            <a:avLst/>
+          </a:prstGeom>
+        </p:spPr>
+      </p:pic>
+      <p:pic>
+        <p:nvPicPr>
+          <p:cNvPr id="7" name="Picture 6"/>
+          <p:cNvPicPr>
+            <a:picLocks noChangeAspect="1"/>
+          </p:cNvPicPr>
+          <p:nvPr/>
+        </p:nvPicPr>
+        <p:blipFill>
+          <a:blip r:embed="rId5">
+            <a:extLst>
+              <a:ext uri="{28A0092B-C50C-407E-A947-70E740481C1C}">
+                <a14:useLocalDpi xmlns:a14="http://schemas.microsoft.com/office/drawing/2010/main" val="0"/>
+              </a:ext>
+            </a:extLst>
+          </a:blip>
+          <a:stretch>
+            <a:fillRect/>
+          </a:stretch>
+        </p:blipFill>
+        <p:spPr>
+          <a:xfrm>
+            <a:off x="3083511" y="1798502"/>
+            <a:ext cx="4619206" cy="4683720"/>
+          </a:xfrm>
+          <a:prstGeom prst="rect">
+            <a:avLst/>
+          </a:prstGeom>
+        </p:spPr>
+      </p:pic>
+      <p:pic>
+        <p:nvPicPr>
+          <p:cNvPr id="8" name="Picture 7"/>
+          <p:cNvPicPr>
+            <a:picLocks noChangeAspect="1"/>
+          </p:cNvPicPr>
+          <p:nvPr/>
+        </p:nvPicPr>
+        <p:blipFill rotWithShape="1">
+          <a:blip r:embed="rId6">
+            <a:extLst>
+              <a:ext uri="{28A0092B-C50C-407E-A947-70E740481C1C}">
+                <a14:useLocalDpi xmlns:a14="http://schemas.microsoft.com/office/drawing/2010/main" val="0"/>
+              </a:ext>
+            </a:extLst>
+          </a:blip>
+          <a:srcRect b="25778"/>
+          <a:stretch/>
+        </p:blipFill>
+        <p:spPr>
+          <a:xfrm>
+            <a:off x="4518621" y="2461156"/>
+            <a:ext cx="7296868" cy="4021066"/>
+          </a:xfrm>
+          <a:prstGeom prst="rect">
+            <a:avLst/>
+          </a:prstGeom>
+        </p:spPr>
+      </p:pic>
     </p:spTree>
     <p:extLst>
       <p:ext uri="{BB962C8B-B14F-4D97-AF65-F5344CB8AC3E}">
@@ -5250,6 +5352,345 @@
   <p:clrMapOvr>
     <a:masterClrMapping/>
   </p:clrMapOvr>
+  <mc:AlternateContent xmlns:mc="http://schemas.openxmlformats.org/markup-compatibility/2006">
+    <mc:Choice xmlns:p14="http://schemas.microsoft.com/office/powerpoint/2010/main" Requires="p14">
+      <p:transition spd="med" p14:dur="700">
+        <p:fade/>
+      </p:transition>
+    </mc:Choice>
+    <mc:Fallback>
+      <p:transition spd="med">
+        <p:fade/>
+      </p:transition>
+    </mc:Fallback>
+  </mc:AlternateContent>
+  <p:timing>
+    <p:tnLst>
+      <p:par>
+        <p:cTn id="1" dur="indefinite" restart="never" nodeType="tmRoot">
+          <p:childTnLst>
+            <p:seq concurrent="1" nextAc="seek">
+              <p:cTn id="2" dur="indefinite" nodeType="mainSeq">
+                <p:childTnLst>
+                  <p:par>
+                    <p:cTn id="3" fill="hold">
+                      <p:stCondLst>
+                        <p:cond delay="indefinite"/>
+                      </p:stCondLst>
+                      <p:childTnLst>
+                        <p:par>
+                          <p:cTn id="4" fill="hold">
+                            <p:stCondLst>
+                              <p:cond delay="0"/>
+                            </p:stCondLst>
+                            <p:childTnLst>
+                              <p:par>
+                                <p:cTn id="5" presetID="42" presetClass="entr" presetSubtype="0" fill="hold" nodeType="clickEffect">
+                                  <p:stCondLst>
+                                    <p:cond delay="0"/>
+                                  </p:stCondLst>
+                                  <p:childTnLst>
+                                    <p:set>
+                                      <p:cBhvr>
+                                        <p:cTn id="6" dur="1" fill="hold">
+                                          <p:stCondLst>
+                                            <p:cond delay="0"/>
+                                          </p:stCondLst>
+                                        </p:cTn>
+                                        <p:tgtEl>
+                                          <p:spTgt spid="6"/>
+                                        </p:tgtEl>
+                                        <p:attrNameLst>
+                                          <p:attrName>style.visibility</p:attrName>
+                                        </p:attrNameLst>
+                                      </p:cBhvr>
+                                      <p:to>
+                                        <p:strVal val="visible"/>
+                                      </p:to>
+                                    </p:set>
+                                    <p:animEffect transition="in" filter="fade">
+                                      <p:cBhvr>
+                                        <p:cTn id="7" dur="1000"/>
+                                        <p:tgtEl>
+                                          <p:spTgt spid="6"/>
+                                        </p:tgtEl>
+                                      </p:cBhvr>
+                                    </p:animEffect>
+                                    <p:anim calcmode="lin" valueType="num">
+                                      <p:cBhvr>
+                                        <p:cTn id="8" dur="1000" fill="hold"/>
+                                        <p:tgtEl>
+                                          <p:spTgt spid="6"/>
+                                        </p:tgtEl>
+                                        <p:attrNameLst>
+                                          <p:attrName>ppt_x</p:attrName>
+                                        </p:attrNameLst>
+                                      </p:cBhvr>
+                                      <p:tavLst>
+                                        <p:tav tm="0">
+                                          <p:val>
+                                            <p:strVal val="#ppt_x"/>
+                                          </p:val>
+                                        </p:tav>
+                                        <p:tav tm="100000">
+                                          <p:val>
+                                            <p:strVal val="#ppt_x"/>
+                                          </p:val>
+                                        </p:tav>
+                                      </p:tavLst>
+                                    </p:anim>
+                                    <p:anim calcmode="lin" valueType="num">
+                                      <p:cBhvr>
+                                        <p:cTn id="9" dur="1000" fill="hold"/>
+                                        <p:tgtEl>
+                                          <p:spTgt spid="6"/>
+                                        </p:tgtEl>
+                                        <p:attrNameLst>
+                                          <p:attrName>ppt_y</p:attrName>
+                                        </p:attrNameLst>
+                                      </p:cBhvr>
+                                      <p:tavLst>
+                                        <p:tav tm="0">
+                                          <p:val>
+                                            <p:strVal val="#ppt_y+.1"/>
+                                          </p:val>
+                                        </p:tav>
+                                        <p:tav tm="100000">
+                                          <p:val>
+                                            <p:strVal val="#ppt_y"/>
+                                          </p:val>
+                                        </p:tav>
+                                      </p:tavLst>
+                                    </p:anim>
+                                  </p:childTnLst>
+                                </p:cTn>
+                              </p:par>
+                            </p:childTnLst>
+                          </p:cTn>
+                        </p:par>
+                      </p:childTnLst>
+                    </p:cTn>
+                  </p:par>
+                  <p:par>
+                    <p:cTn id="10" fill="hold">
+                      <p:stCondLst>
+                        <p:cond delay="indefinite"/>
+                      </p:stCondLst>
+                      <p:childTnLst>
+                        <p:par>
+                          <p:cTn id="11" fill="hold">
+                            <p:stCondLst>
+                              <p:cond delay="0"/>
+                            </p:stCondLst>
+                            <p:childTnLst>
+                              <p:par>
+                                <p:cTn id="12" presetID="42" presetClass="entr" presetSubtype="0" fill="hold" nodeType="clickEffect">
+                                  <p:stCondLst>
+                                    <p:cond delay="0"/>
+                                  </p:stCondLst>
+                                  <p:childTnLst>
+                                    <p:set>
+                                      <p:cBhvr>
+                                        <p:cTn id="13" dur="1" fill="hold">
+                                          <p:stCondLst>
+                                            <p:cond delay="0"/>
+                                          </p:stCondLst>
+                                        </p:cTn>
+                                        <p:tgtEl>
+                                          <p:spTgt spid="7"/>
+                                        </p:tgtEl>
+                                        <p:attrNameLst>
+                                          <p:attrName>style.visibility</p:attrName>
+                                        </p:attrNameLst>
+                                      </p:cBhvr>
+                                      <p:to>
+                                        <p:strVal val="visible"/>
+                                      </p:to>
+                                    </p:set>
+                                    <p:animEffect transition="in" filter="fade">
+                                      <p:cBhvr>
+                                        <p:cTn id="14" dur="1000"/>
+                                        <p:tgtEl>
+                                          <p:spTgt spid="7"/>
+                                        </p:tgtEl>
+                                      </p:cBhvr>
+                                    </p:animEffect>
+                                    <p:anim calcmode="lin" valueType="num">
+                                      <p:cBhvr>
+                                        <p:cTn id="15" dur="1000" fill="hold"/>
+                                        <p:tgtEl>
+                                          <p:spTgt spid="7"/>
+                                        </p:tgtEl>
+                                        <p:attrNameLst>
+                                          <p:attrName>ppt_x</p:attrName>
+                                        </p:attrNameLst>
+                                      </p:cBhvr>
+                                      <p:tavLst>
+                                        <p:tav tm="0">
+                                          <p:val>
+                                            <p:strVal val="#ppt_x"/>
+                                          </p:val>
+                                        </p:tav>
+                                        <p:tav tm="100000">
+                                          <p:val>
+                                            <p:strVal val="#ppt_x"/>
+                                          </p:val>
+                                        </p:tav>
+                                      </p:tavLst>
+                                    </p:anim>
+                                    <p:anim calcmode="lin" valueType="num">
+                                      <p:cBhvr>
+                                        <p:cTn id="16" dur="1000" fill="hold"/>
+                                        <p:tgtEl>
+                                          <p:spTgt spid="7"/>
+                                        </p:tgtEl>
+                                        <p:attrNameLst>
+                                          <p:attrName>ppt_y</p:attrName>
+                                        </p:attrNameLst>
+                                      </p:cBhvr>
+                                      <p:tavLst>
+                                        <p:tav tm="0">
+                                          <p:val>
+                                            <p:strVal val="#ppt_y+.1"/>
+                                          </p:val>
+                                        </p:tav>
+                                        <p:tav tm="100000">
+                                          <p:val>
+                                            <p:strVal val="#ppt_y"/>
+                                          </p:val>
+                                        </p:tav>
+                                      </p:tavLst>
+                                    </p:anim>
+                                  </p:childTnLst>
+                                </p:cTn>
+                              </p:par>
+                            </p:childTnLst>
+                          </p:cTn>
+                        </p:par>
+                      </p:childTnLst>
+                    </p:cTn>
+                  </p:par>
+                  <p:par>
+                    <p:cTn id="17" fill="hold">
+                      <p:stCondLst>
+                        <p:cond delay="indefinite"/>
+                      </p:stCondLst>
+                      <p:childTnLst>
+                        <p:par>
+                          <p:cTn id="18" fill="hold">
+                            <p:stCondLst>
+                              <p:cond delay="0"/>
+                            </p:stCondLst>
+                            <p:childTnLst>
+                              <p:par>
+                                <p:cTn id="19" presetID="42" presetClass="entr" presetSubtype="0" fill="hold" nodeType="clickEffect">
+                                  <p:stCondLst>
+                                    <p:cond delay="0"/>
+                                  </p:stCondLst>
+                                  <p:childTnLst>
+                                    <p:set>
+                                      <p:cBhvr>
+                                        <p:cTn id="20" dur="1" fill="hold">
+                                          <p:stCondLst>
+                                            <p:cond delay="0"/>
+                                          </p:stCondLst>
+                                        </p:cTn>
+                                        <p:tgtEl>
+                                          <p:spTgt spid="8"/>
+                                        </p:tgtEl>
+                                        <p:attrNameLst>
+                                          <p:attrName>style.visibility</p:attrName>
+                                        </p:attrNameLst>
+                                      </p:cBhvr>
+                                      <p:to>
+                                        <p:strVal val="visible"/>
+                                      </p:to>
+                                    </p:set>
+                                    <p:animEffect transition="in" filter="fade">
+                                      <p:cBhvr>
+                                        <p:cTn id="21" dur="1000"/>
+                                        <p:tgtEl>
+                                          <p:spTgt spid="8"/>
+                                        </p:tgtEl>
+                                      </p:cBhvr>
+                                    </p:animEffect>
+                                    <p:anim calcmode="lin" valueType="num">
+                                      <p:cBhvr>
+                                        <p:cTn id="22" dur="1000" fill="hold"/>
+                                        <p:tgtEl>
+                                          <p:spTgt spid="8"/>
+                                        </p:tgtEl>
+                                        <p:attrNameLst>
+                                          <p:attrName>ppt_x</p:attrName>
+                                        </p:attrNameLst>
+                                      </p:cBhvr>
+                                      <p:tavLst>
+                                        <p:tav tm="0">
+                                          <p:val>
+                                            <p:strVal val="#ppt_x"/>
+                                          </p:val>
+                                        </p:tav>
+                                        <p:tav tm="100000">
+                                          <p:val>
+                                            <p:strVal val="#ppt_x"/>
+                                          </p:val>
+                                        </p:tav>
+                                      </p:tavLst>
+                                    </p:anim>
+                                    <p:anim calcmode="lin" valueType="num">
+                                      <p:cBhvr>
+                                        <p:cTn id="23" dur="1000" fill="hold"/>
+                                        <p:tgtEl>
+                                          <p:spTgt spid="8"/>
+                                        </p:tgtEl>
+                                        <p:attrNameLst>
+                                          <p:attrName>ppt_y</p:attrName>
+                                        </p:attrNameLst>
+                                      </p:cBhvr>
+                                      <p:tavLst>
+                                        <p:tav tm="0">
+                                          <p:val>
+                                            <p:strVal val="#ppt_y+.1"/>
+                                          </p:val>
+                                        </p:tav>
+                                        <p:tav tm="100000">
+                                          <p:val>
+                                            <p:strVal val="#ppt_y"/>
+                                          </p:val>
+                                        </p:tav>
+                                      </p:tavLst>
+                                    </p:anim>
+                                  </p:childTnLst>
+                                </p:cTn>
+                              </p:par>
+                            </p:childTnLst>
+                          </p:cTn>
+                        </p:par>
+                      </p:childTnLst>
+                    </p:cTn>
+                  </p:par>
+                </p:childTnLst>
+              </p:cTn>
+              <p:prevCondLst>
+                <p:cond evt="onPrev" delay="0">
+                  <p:tgtEl>
+                    <p:sldTgt/>
+                  </p:tgtEl>
+                </p:cond>
+              </p:prevCondLst>
+              <p:nextCondLst>
+                <p:cond evt="onNext" delay="0">
+                  <p:tgtEl>
+                    <p:sldTgt/>
+                  </p:tgtEl>
+                </p:cond>
+              </p:nextCondLst>
+            </p:seq>
+          </p:childTnLst>
+        </p:cTn>
+      </p:par>
+    </p:tnLst>
+  </p:timing>
 </p:sld>
 </file>
 
@@ -5554,7 +5995,7 @@
                     <a14:useLocalDpi xmlns:a14="http://schemas.microsoft.com/office/drawing/2010/main" val="0"/>
                   </a:ext>
                   <a:ext uri="{96DAC541-7B7A-43D3-8B79-37D633B846F1}">
-                    <asvg:svgBlip xmlns:asvg="http://schemas.microsoft.com/office/drawing/2016/SVG/main" r:embed="rId3"/>
+                    <asvg:svgBlip xmlns:asvg="http://schemas.microsoft.com/office/drawing/2016/SVG/main" xmlns="" r:embed="rId3"/>
                   </a:ext>
                 </a:extLst>
               </a:blip>
@@ -5603,6 +6044,13 @@
   <p:clrMapOvr>
     <a:masterClrMapping/>
   </p:clrMapOvr>
+  <p:timing>
+    <p:tnLst>
+      <p:par>
+        <p:cTn id="1" dur="indefinite" restart="never" nodeType="tmRoot"/>
+      </p:par>
+    </p:tnLst>
+  </p:timing>
 </p:sld>
 </file>
 
@@ -5889,6 +6337,13 @@
   <p:clrMapOvr>
     <a:masterClrMapping/>
   </p:clrMapOvr>
+  <p:timing>
+    <p:tnLst>
+      <p:par>
+        <p:cTn id="1" dur="indefinite" restart="never" nodeType="tmRoot"/>
+      </p:par>
+    </p:tnLst>
+  </p:timing>
 </p:sld>
 </file>
 
@@ -6165,7 +6620,7 @@
                   <a14:useLocalDpi xmlns:a14="http://schemas.microsoft.com/office/drawing/2010/main" val="0"/>
                 </a:ext>
                 <a:ext uri="{96DAC541-7B7A-43D3-8B79-37D633B846F1}">
-                  <asvg:svgBlip xmlns:asvg="http://schemas.microsoft.com/office/drawing/2016/SVG/main" r:embed="rId3"/>
+                  <asvg:svgBlip xmlns:asvg="http://schemas.microsoft.com/office/drawing/2016/SVG/main" xmlns="" r:embed="rId3"/>
                 </a:ext>
               </a:extLst>
             </a:blip>
@@ -6213,6 +6668,13 @@
   <p:clrMapOvr>
     <a:masterClrMapping/>
   </p:clrMapOvr>
+  <p:timing>
+    <p:tnLst>
+      <p:par>
+        <p:cTn id="1" dur="indefinite" restart="never" nodeType="tmRoot"/>
+      </p:par>
+    </p:tnLst>
+  </p:timing>
 </p:sld>
 </file>
 
@@ -6284,7 +6746,7 @@
                 <a16:creationId xmlns:a16="http://schemas.microsoft.com/office/drawing/2014/main" id="{2644B391-9BFE-445C-A9EC-F544BB85FBC7}"/>
               </a:ext>
               <a:ext uri="{C183D7F6-B498-43B3-948B-1728B52AA6E4}">
-                <adec:decorative xmlns:adec="http://schemas.microsoft.com/office/drawing/2017/decorative" val="1"/>
+                <adec:decorative xmlns:adec="http://schemas.microsoft.com/office/drawing/2017/decorative" xmlns="" val="1"/>
               </a:ext>
             </a:extLst>
           </p:cNvPr>
@@ -6329,7 +6791,7 @@
                 <a16:creationId xmlns:a16="http://schemas.microsoft.com/office/drawing/2014/main" id="{80F26E69-87D9-4655-AE7B-280A87AA3CAD}"/>
               </a:ext>
               <a:ext uri="{C183D7F6-B498-43B3-948B-1728B52AA6E4}">
-                <adec:decorative xmlns:adec="http://schemas.microsoft.com/office/drawing/2017/decorative" val="1"/>
+                <adec:decorative xmlns:adec="http://schemas.microsoft.com/office/drawing/2017/decorative" xmlns="" val="1"/>
               </a:ext>
             </a:extLst>
           </p:cNvPr>
@@ -6738,24 +7200,6 @@
 </file>
 
 <file path=customXml/item1.xml><?xml version="1.0" encoding="utf-8"?>
-<p:properties xmlns:p="http://schemas.microsoft.com/office/2006/metadata/properties" xmlns:xsi="http://www.w3.org/2001/XMLSchema-instance" xmlns:pc="http://schemas.microsoft.com/office/infopath/2007/PartnerControls">
-  <documentManagement>
-    <Status xmlns="71af3243-3dd4-4a8d-8c0d-dd76da1f02a5">Not started</Status>
-    <MediaServiceKeyPoints xmlns="71af3243-3dd4-4a8d-8c0d-dd76da1f02a5" xsi:nil="true"/>
-  </documentManagement>
-</p:properties>
-</file>
-
-<file path=customXml/item2.xml><?xml version="1.0" encoding="utf-8"?>
-<?mso-contentType ?>
-<FormTemplates xmlns="http://schemas.microsoft.com/sharepoint/v3/contenttype/forms">
-  <Display>DocumentLibraryForm</Display>
-  <Edit>DocumentLibraryForm</Edit>
-  <New>DocumentLibraryForm</New>
-</FormTemplates>
-</file>
-
-<file path=customXml/item3.xml><?xml version="1.0" encoding="utf-8"?>
 <ct:contentTypeSchema xmlns:ct="http://schemas.microsoft.com/office/2006/metadata/contentType" xmlns:ma="http://schemas.microsoft.com/office/2006/metadata/properties/metaAttributes" ct:_="" ma:_="" ma:contentTypeName="Document" ma:contentTypeID="0x01010079F111ED35F8CC479449609E8A0923A6" ma:contentTypeVersion="12" ma:contentTypeDescription="Create a new document." ma:contentTypeScope="" ma:versionID="a410dd7f93c95333ffa1b60ed6adedd1">
   <xsd:schema xmlns:xsd="http://www.w3.org/2001/XMLSchema" xmlns:xs="http://www.w3.org/2001/XMLSchema" xmlns:p="http://schemas.microsoft.com/office/2006/metadata/properties" xmlns:ns2="71af3243-3dd4-4a8d-8c0d-dd76da1f02a5" xmlns:ns3="16c05727-aa75-4e4a-9b5f-8a80a1165891" targetNamespace="http://schemas.microsoft.com/office/2006/metadata/properties" ma:root="true" ma:fieldsID="a936d9baba76aa3866493feff160faab" ns2:_="" ns3:_="">
     <xsd:import namespace="71af3243-3dd4-4a8d-8c0d-dd76da1f02a5"/>
@@ -6976,25 +7420,25 @@
 </ct:contentTypeSchema>
 </file>
 
-<file path=customXml/itemProps1.xml><?xml version="1.0" encoding="utf-8"?>
-<ds:datastoreItem xmlns:ds="http://schemas.openxmlformats.org/officeDocument/2006/customXml" ds:itemID="{137651BA-F45C-4845-9AB3-E0A65B39F5E1}">
-  <ds:schemaRefs>
-    <ds:schemaRef ds:uri="http://schemas.microsoft.com/office/2006/metadata/properties"/>
-    <ds:schemaRef ds:uri="http://schemas.microsoft.com/office/infopath/2007/PartnerControls"/>
-    <ds:schemaRef ds:uri="71af3243-3dd4-4a8d-8c0d-dd76da1f02a5"/>
-  </ds:schemaRefs>
-</ds:datastoreItem>
+<file path=customXml/item2.xml><?xml version="1.0" encoding="utf-8"?>
+<?mso-contentType ?>
+<FormTemplates xmlns="http://schemas.microsoft.com/sharepoint/v3/contenttype/forms">
+  <Display>DocumentLibraryForm</Display>
+  <Edit>DocumentLibraryForm</Edit>
+  <New>DocumentLibraryForm</New>
+</FormTemplates>
 </file>
 
-<file path=customXml/itemProps2.xml><?xml version="1.0" encoding="utf-8"?>
-<ds:datastoreItem xmlns:ds="http://schemas.openxmlformats.org/officeDocument/2006/customXml" ds:itemID="{CDB58277-F8DF-46FF-84EC-EF41B835E69F}">
-  <ds:schemaRefs>
-    <ds:schemaRef ds:uri="http://schemas.microsoft.com/sharepoint/v3/contenttype/forms"/>
-  </ds:schemaRefs>
-</ds:datastoreItem>
+<file path=customXml/item3.xml><?xml version="1.0" encoding="utf-8"?>
+<p:properties xmlns:p="http://schemas.microsoft.com/office/2006/metadata/properties" xmlns:xsi="http://www.w3.org/2001/XMLSchema-instance" xmlns:pc="http://schemas.microsoft.com/office/infopath/2007/PartnerControls">
+  <documentManagement>
+    <Status xmlns="71af3243-3dd4-4a8d-8c0d-dd76da1f02a5">Not started</Status>
+    <MediaServiceKeyPoints xmlns="71af3243-3dd4-4a8d-8c0d-dd76da1f02a5" xsi:nil="true"/>
+  </documentManagement>
+</p:properties>
 </file>
 
-<file path=customXml/itemProps3.xml><?xml version="1.0" encoding="utf-8"?>
+<file path=customXml/itemProps1.xml><?xml version="1.0" encoding="utf-8"?>
 <ds:datastoreItem xmlns:ds="http://schemas.openxmlformats.org/officeDocument/2006/customXml" ds:itemID="{2D276E62-80A3-44DD-9BCC-97ED2B99B57F}">
   <ds:schemaRefs>
     <ds:schemaRef ds:uri="http://schemas.microsoft.com/office/2006/metadata/contentType"/>
@@ -7011,4 +7455,22 @@
     <ds:schemaRef ds:uri="http://schemas.microsoft.com/internal/obd"/>
   </ds:schemaRefs>
 </ds:datastoreItem>
+</file>
+
+<file path=customXml/itemProps2.xml><?xml version="1.0" encoding="utf-8"?>
+<ds:datastoreItem xmlns:ds="http://schemas.openxmlformats.org/officeDocument/2006/customXml" ds:itemID="{CDB58277-F8DF-46FF-84EC-EF41B835E69F}">
+  <ds:schemaRefs>
+    <ds:schemaRef ds:uri="http://schemas.microsoft.com/sharepoint/v3/contenttype/forms"/>
+  </ds:schemaRefs>
+</ds:datastoreItem>
+</file>
+
+<file path=customXml/itemProps3.xml><?xml version="1.0" encoding="utf-8"?>
+<ds:datastoreItem xmlns:ds="http://schemas.openxmlformats.org/officeDocument/2006/customXml" ds:itemID="{137651BA-F45C-4845-9AB3-E0A65B39F5E1}">
+  <ds:schemaRefs>
+    <ds:schemaRef ds:uri="http://schemas.microsoft.com/office/2006/metadata/properties"/>
+    <ds:schemaRef ds:uri="http://schemas.microsoft.com/office/infopath/2007/PartnerControls"/>
+    <ds:schemaRef ds:uri="71af3243-3dd4-4a8d-8c0d-dd76da1f02a5"/>
+  </ds:schemaRefs>
+</ds:datastoreItem>
 </file>
</xml_diff>

<commit_message>
add screenshot of Github collaboration in PPT
</commit_message>
<xml_diff>
--- a/ACDH-FlightAppProject.pptx
+++ b/ACDH-FlightAppProject.pptx
@@ -4071,7 +4071,7 @@
                 <a16:creationId xmlns:a16="http://schemas.microsoft.com/office/drawing/2014/main" id="{2644B391-9BFE-445C-A9EC-F544BB85FBC7}"/>
               </a:ext>
               <a:ext uri="{C183D7F6-B498-43B3-948B-1728B52AA6E4}">
-                <adec:decorative xmlns:adec="http://schemas.microsoft.com/office/drawing/2017/decorative" xmlns="" val="1"/>
+                <adec:decorative xmlns="" xmlns:adec="http://schemas.microsoft.com/office/drawing/2017/decorative" val="1"/>
               </a:ext>
             </a:extLst>
           </p:cNvPr>
@@ -4116,7 +4116,7 @@
                 <a16:creationId xmlns:a16="http://schemas.microsoft.com/office/drawing/2014/main" id="{80F26E69-87D9-4655-AE7B-280A87AA3CAD}"/>
               </a:ext>
               <a:ext uri="{C183D7F6-B498-43B3-948B-1728B52AA6E4}">
-                <adec:decorative xmlns:adec="http://schemas.microsoft.com/office/drawing/2017/decorative" xmlns="" val="1"/>
+                <adec:decorative xmlns="" xmlns:adec="http://schemas.microsoft.com/office/drawing/2017/decorative" val="1"/>
               </a:ext>
             </a:extLst>
           </p:cNvPr>
@@ -4582,7 +4582,7 @@
                   <a14:useLocalDpi xmlns:a14="http://schemas.microsoft.com/office/drawing/2010/main" val="0"/>
                 </a:ext>
                 <a:ext uri="{96DAC541-7B7A-43D3-8B79-37D633B846F1}">
-                  <asvg:svgBlip xmlns:asvg="http://schemas.microsoft.com/office/drawing/2016/SVG/main" xmlns="" r:embed="rId3"/>
+                  <asvg:svgBlip xmlns="" xmlns:asvg="http://schemas.microsoft.com/office/drawing/2016/SVG/main" r:embed="rId3"/>
                 </a:ext>
               </a:extLst>
             </a:blip>
@@ -4833,7 +4833,7 @@
                   <a14:useLocalDpi xmlns:a14="http://schemas.microsoft.com/office/drawing/2010/main" val="0"/>
                 </a:ext>
                 <a:ext uri="{96DAC541-7B7A-43D3-8B79-37D633B846F1}">
-                  <asvg:svgBlip xmlns:asvg="http://schemas.microsoft.com/office/drawing/2016/SVG/main" xmlns="" r:embed="rId5"/>
+                  <asvg:svgBlip xmlns="" xmlns:asvg="http://schemas.microsoft.com/office/drawing/2016/SVG/main" r:embed="rId5"/>
                 </a:ext>
               </a:extLst>
             </a:blip>
@@ -5215,7 +5215,7 @@
                     <a14:useLocalDpi xmlns:a14="http://schemas.microsoft.com/office/drawing/2010/main" val="0"/>
                   </a:ext>
                   <a:ext uri="{96DAC541-7B7A-43D3-8B79-37D633B846F1}">
-                    <asvg:svgBlip xmlns:asvg="http://schemas.microsoft.com/office/drawing/2016/SVG/main" xmlns="" r:embed="rId3"/>
+                    <asvg:svgBlip xmlns="" xmlns:asvg="http://schemas.microsoft.com/office/drawing/2016/SVG/main" r:embed="rId3"/>
                   </a:ext>
                 </a:extLst>
               </a:blip>
@@ -5352,13 +5352,13 @@
   <p:clrMapOvr>
     <a:masterClrMapping/>
   </p:clrMapOvr>
-  <mc:AlternateContent xmlns:mc="http://schemas.openxmlformats.org/markup-compatibility/2006">
-    <mc:Choice xmlns:p14="http://schemas.microsoft.com/office/powerpoint/2010/main" Requires="p14">
+  <mc:AlternateContent xmlns:mc="http://schemas.openxmlformats.org/markup-compatibility/2006" xmlns:p14="http://schemas.microsoft.com/office/powerpoint/2010/main">
+    <mc:Choice Requires="p14">
       <p:transition spd="med" p14:dur="700">
         <p:fade/>
       </p:transition>
     </mc:Choice>
-    <mc:Fallback>
+    <mc:Fallback xmlns="">
       <p:transition spd="med">
         <p:fade/>
       </p:transition>
@@ -5995,7 +5995,7 @@
                     <a14:useLocalDpi xmlns:a14="http://schemas.microsoft.com/office/drawing/2010/main" val="0"/>
                   </a:ext>
                   <a:ext uri="{96DAC541-7B7A-43D3-8B79-37D633B846F1}">
-                    <asvg:svgBlip xmlns:asvg="http://schemas.microsoft.com/office/drawing/2016/SVG/main" xmlns="" r:embed="rId3"/>
+                    <asvg:svgBlip xmlns="" xmlns:asvg="http://schemas.microsoft.com/office/drawing/2016/SVG/main" r:embed="rId3"/>
                   </a:ext>
                 </a:extLst>
               </a:blip>
@@ -6620,7 +6620,7 @@
                   <a14:useLocalDpi xmlns:a14="http://schemas.microsoft.com/office/drawing/2010/main" val="0"/>
                 </a:ext>
                 <a:ext uri="{96DAC541-7B7A-43D3-8B79-37D633B846F1}">
-                  <asvg:svgBlip xmlns:asvg="http://schemas.microsoft.com/office/drawing/2016/SVG/main" xmlns="" r:embed="rId3"/>
+                  <asvg:svgBlip xmlns="" xmlns:asvg="http://schemas.microsoft.com/office/drawing/2016/SVG/main" r:embed="rId3"/>
                 </a:ext>
               </a:extLst>
             </a:blip>
@@ -6658,6 +6658,30 @@
           </a:fontRef>
         </p:style>
       </p:sp>
+      <p:pic>
+        <p:nvPicPr>
+          <p:cNvPr id="3" name="Picture 2"/>
+          <p:cNvPicPr>
+            <a:picLocks noChangeAspect="1"/>
+          </p:cNvPicPr>
+          <p:nvPr/>
+        </p:nvPicPr>
+        <p:blipFill>
+          <a:blip r:embed="rId4"/>
+          <a:stretch>
+            <a:fillRect/>
+          </a:stretch>
+        </p:blipFill>
+        <p:spPr>
+          <a:xfrm>
+            <a:off x="580259" y="2848383"/>
+            <a:ext cx="8907118" cy="2657846"/>
+          </a:xfrm>
+          <a:prstGeom prst="rect">
+            <a:avLst/>
+          </a:prstGeom>
+        </p:spPr>
+      </p:pic>
     </p:spTree>
     <p:extLst>
       <p:ext uri="{BB962C8B-B14F-4D97-AF65-F5344CB8AC3E}">
@@ -6746,7 +6770,7 @@
                 <a16:creationId xmlns:a16="http://schemas.microsoft.com/office/drawing/2014/main" id="{2644B391-9BFE-445C-A9EC-F544BB85FBC7}"/>
               </a:ext>
               <a:ext uri="{C183D7F6-B498-43B3-948B-1728B52AA6E4}">
-                <adec:decorative xmlns:adec="http://schemas.microsoft.com/office/drawing/2017/decorative" xmlns="" val="1"/>
+                <adec:decorative xmlns="" xmlns:adec="http://schemas.microsoft.com/office/drawing/2017/decorative" val="1"/>
               </a:ext>
             </a:extLst>
           </p:cNvPr>
@@ -6791,7 +6815,7 @@
                 <a16:creationId xmlns:a16="http://schemas.microsoft.com/office/drawing/2014/main" id="{80F26E69-87D9-4655-AE7B-280A87AA3CAD}"/>
               </a:ext>
               <a:ext uri="{C183D7F6-B498-43B3-948B-1728B52AA6E4}">
-                <adec:decorative xmlns:adec="http://schemas.microsoft.com/office/drawing/2017/decorative" xmlns="" val="1"/>
+                <adec:decorative xmlns="" xmlns:adec="http://schemas.microsoft.com/office/drawing/2017/decorative" val="1"/>
               </a:ext>
             </a:extLst>
           </p:cNvPr>
@@ -7200,6 +7224,24 @@
 </file>
 
 <file path=customXml/item1.xml><?xml version="1.0" encoding="utf-8"?>
+<p:properties xmlns:p="http://schemas.microsoft.com/office/2006/metadata/properties" xmlns:xsi="http://www.w3.org/2001/XMLSchema-instance" xmlns:pc="http://schemas.microsoft.com/office/infopath/2007/PartnerControls">
+  <documentManagement>
+    <Status xmlns="71af3243-3dd4-4a8d-8c0d-dd76da1f02a5">Not started</Status>
+    <MediaServiceKeyPoints xmlns="71af3243-3dd4-4a8d-8c0d-dd76da1f02a5" xsi:nil="true"/>
+  </documentManagement>
+</p:properties>
+</file>
+
+<file path=customXml/item2.xml><?xml version="1.0" encoding="utf-8"?>
+<?mso-contentType ?>
+<FormTemplates xmlns="http://schemas.microsoft.com/sharepoint/v3/contenttype/forms">
+  <Display>DocumentLibraryForm</Display>
+  <Edit>DocumentLibraryForm</Edit>
+  <New>DocumentLibraryForm</New>
+</FormTemplates>
+</file>
+
+<file path=customXml/item3.xml><?xml version="1.0" encoding="utf-8"?>
 <ct:contentTypeSchema xmlns:ct="http://schemas.microsoft.com/office/2006/metadata/contentType" xmlns:ma="http://schemas.microsoft.com/office/2006/metadata/properties/metaAttributes" ct:_="" ma:_="" ma:contentTypeName="Document" ma:contentTypeID="0x01010079F111ED35F8CC479449609E8A0923A6" ma:contentTypeVersion="12" ma:contentTypeDescription="Create a new document." ma:contentTypeScope="" ma:versionID="a410dd7f93c95333ffa1b60ed6adedd1">
   <xsd:schema xmlns:xsd="http://www.w3.org/2001/XMLSchema" xmlns:xs="http://www.w3.org/2001/XMLSchema" xmlns:p="http://schemas.microsoft.com/office/2006/metadata/properties" xmlns:ns2="71af3243-3dd4-4a8d-8c0d-dd76da1f02a5" xmlns:ns3="16c05727-aa75-4e4a-9b5f-8a80a1165891" targetNamespace="http://schemas.microsoft.com/office/2006/metadata/properties" ma:root="true" ma:fieldsID="a936d9baba76aa3866493feff160faab" ns2:_="" ns3:_="">
     <xsd:import namespace="71af3243-3dd4-4a8d-8c0d-dd76da1f02a5"/>
@@ -7420,25 +7462,25 @@
 </ct:contentTypeSchema>
 </file>
 
-<file path=customXml/item2.xml><?xml version="1.0" encoding="utf-8"?>
-<?mso-contentType ?>
-<FormTemplates xmlns="http://schemas.microsoft.com/sharepoint/v3/contenttype/forms">
-  <Display>DocumentLibraryForm</Display>
-  <Edit>DocumentLibraryForm</Edit>
-  <New>DocumentLibraryForm</New>
-</FormTemplates>
+<file path=customXml/itemProps1.xml><?xml version="1.0" encoding="utf-8"?>
+<ds:datastoreItem xmlns:ds="http://schemas.openxmlformats.org/officeDocument/2006/customXml" ds:itemID="{137651BA-F45C-4845-9AB3-E0A65B39F5E1}">
+  <ds:schemaRefs>
+    <ds:schemaRef ds:uri="http://schemas.microsoft.com/office/2006/metadata/properties"/>
+    <ds:schemaRef ds:uri="http://schemas.microsoft.com/office/infopath/2007/PartnerControls"/>
+    <ds:schemaRef ds:uri="71af3243-3dd4-4a8d-8c0d-dd76da1f02a5"/>
+  </ds:schemaRefs>
+</ds:datastoreItem>
 </file>
 
-<file path=customXml/item3.xml><?xml version="1.0" encoding="utf-8"?>
-<p:properties xmlns:p="http://schemas.microsoft.com/office/2006/metadata/properties" xmlns:xsi="http://www.w3.org/2001/XMLSchema-instance" xmlns:pc="http://schemas.microsoft.com/office/infopath/2007/PartnerControls">
-  <documentManagement>
-    <Status xmlns="71af3243-3dd4-4a8d-8c0d-dd76da1f02a5">Not started</Status>
-    <MediaServiceKeyPoints xmlns="71af3243-3dd4-4a8d-8c0d-dd76da1f02a5" xsi:nil="true"/>
-  </documentManagement>
-</p:properties>
+<file path=customXml/itemProps2.xml><?xml version="1.0" encoding="utf-8"?>
+<ds:datastoreItem xmlns:ds="http://schemas.openxmlformats.org/officeDocument/2006/customXml" ds:itemID="{CDB58277-F8DF-46FF-84EC-EF41B835E69F}">
+  <ds:schemaRefs>
+    <ds:schemaRef ds:uri="http://schemas.microsoft.com/sharepoint/v3/contenttype/forms"/>
+  </ds:schemaRefs>
+</ds:datastoreItem>
 </file>
 
-<file path=customXml/itemProps1.xml><?xml version="1.0" encoding="utf-8"?>
+<file path=customXml/itemProps3.xml><?xml version="1.0" encoding="utf-8"?>
 <ds:datastoreItem xmlns:ds="http://schemas.openxmlformats.org/officeDocument/2006/customXml" ds:itemID="{2D276E62-80A3-44DD-9BCC-97ED2B99B57F}">
   <ds:schemaRefs>
     <ds:schemaRef ds:uri="http://schemas.microsoft.com/office/2006/metadata/contentType"/>
@@ -7455,22 +7497,4 @@
     <ds:schemaRef ds:uri="http://schemas.microsoft.com/internal/obd"/>
   </ds:schemaRefs>
 </ds:datastoreItem>
-</file>
-
-<file path=customXml/itemProps2.xml><?xml version="1.0" encoding="utf-8"?>
-<ds:datastoreItem xmlns:ds="http://schemas.openxmlformats.org/officeDocument/2006/customXml" ds:itemID="{CDB58277-F8DF-46FF-84EC-EF41B835E69F}">
-  <ds:schemaRefs>
-    <ds:schemaRef ds:uri="http://schemas.microsoft.com/sharepoint/v3/contenttype/forms"/>
-  </ds:schemaRefs>
-</ds:datastoreItem>
-</file>
-
-<file path=customXml/itemProps3.xml><?xml version="1.0" encoding="utf-8"?>
-<ds:datastoreItem xmlns:ds="http://schemas.openxmlformats.org/officeDocument/2006/customXml" ds:itemID="{137651BA-F45C-4845-9AB3-E0A65B39F5E1}">
-  <ds:schemaRefs>
-    <ds:schemaRef ds:uri="http://schemas.microsoft.com/office/2006/metadata/properties"/>
-    <ds:schemaRef ds:uri="http://schemas.microsoft.com/office/infopath/2007/PartnerControls"/>
-    <ds:schemaRef ds:uri="71af3243-3dd4-4a8d-8c0d-dd76da1f02a5"/>
-  </ds:schemaRefs>
-</ds:datastoreItem>
 </file>
</xml_diff>